<commit_message>
Staff meeting fourth version
</commit_message>
<xml_diff>
--- a/RickHui_Staff_Meeting_Presentation.pptx
+++ b/RickHui_Staff_Meeting_Presentation.pptx
@@ -41188,8 +41188,8 @@
           <p:nvPr/>
         </p:nvSpPr>
         <p:spPr>
-          <a:xfrm rot="2577039">
-            <a:off x="4066383" y="2354140"/>
+          <a:xfrm rot="2065803">
+            <a:off x="4111694" y="2361198"/>
             <a:ext cx="934844" cy="338554"/>
           </a:xfrm>
           <a:prstGeom prst="rect">
@@ -41316,8 +41316,8 @@
           <p:nvPr/>
         </p:nvSpPr>
         <p:spPr bwMode="auto">
-          <a:xfrm rot="2568369">
-            <a:off x="3669268" y="2557191"/>
+          <a:xfrm rot="2078952">
+            <a:off x="3749950" y="2557191"/>
             <a:ext cx="1285486" cy="244079"/>
           </a:xfrm>
           <a:prstGeom prst="leftRightArrow">
@@ -45401,7 +45401,7 @@
             <a:avLst/>
           </a:prstGeom>
           <a:solidFill>
-            <a:srgbClr val="FBE700"/>
+            <a:schemeClr val="bg1"/>
           </a:solidFill>
           <a:ln w="6350" cap="flat" cmpd="sng" algn="ctr">
             <a:noFill/>

</xml_diff>

<commit_message>
Change Relaxing to Cheerful
</commit_message>
<xml_diff>
--- a/RickHui_Staff_Meeting_Presentation.pptx
+++ b/RickHui_Staff_Meeting_Presentation.pptx
@@ -37012,7 +37012,7 @@
           <p:nvPr>
             <p:extLst>
               <p:ext uri="{D42A27DB-BD31-4B8C-83A1-F6EECF244321}">
-                <p14:modId xmlns:p14="http://schemas.microsoft.com/office/powerpoint/2010/main" val="30876565"/>
+                <p14:modId xmlns:p14="http://schemas.microsoft.com/office/powerpoint/2010/main" val="3881662441"/>
               </p:ext>
             </p:extLst>
           </p:nvPr>
@@ -37286,9 +37286,10 @@
                         <a:buChar char="§"/>
                       </a:pPr>
                       <a:r>
-                        <a:rPr lang="en-US" sz="1400" dirty="0" smtClean="0"/>
-                        <a:t>Relaxing</a:t>
+                        <a:rPr lang="en-US" sz="1400" smtClean="0"/>
+                        <a:t>Cheerful</a:t>
                       </a:r>
+                      <a:endParaRPr lang="en-US" sz="1400" dirty="0" smtClean="0"/>
                     </a:p>
                     <a:p>
                       <a:pPr marL="285750" indent="-285750" algn="l">

</xml_diff>